<commit_message>
Update Online Car Rental System presentation v2.pptx
</commit_message>
<xml_diff>
--- a/Online Car Rental System presentation v2.pptx
+++ b/Online Car Rental System presentation v2.pptx
@@ -4288,14 +4288,14 @@
                 <a:gridCol w="5216968">
                   <a:extLst>
                     <a:ext uri="{9D8B030D-6E8A-4147-A177-3AD203B41FA5}">
-                      <a16:colId xmlns:a16="http://schemas.microsoft.com/office/drawing/2014/main" xmlns="" val="20000"/>
+                      <a16:colId xmlns="" xmlns:a16="http://schemas.microsoft.com/office/drawing/2014/main" val="20000"/>
                     </a:ext>
                   </a:extLst>
                 </a:gridCol>
                 <a:gridCol w="5216968">
                   <a:extLst>
                     <a:ext uri="{9D8B030D-6E8A-4147-A177-3AD203B41FA5}">
-                      <a16:colId xmlns:a16="http://schemas.microsoft.com/office/drawing/2014/main" xmlns="" val="20001"/>
+                      <a16:colId xmlns="" xmlns:a16="http://schemas.microsoft.com/office/drawing/2014/main" val="20001"/>
                     </a:ext>
                   </a:extLst>
                 </a:gridCol>
@@ -4373,7 +4373,7 @@
                 </a:tc>
                 <a:extLst>
                   <a:ext uri="{0D108BD9-81ED-4DB2-BD59-A6C34878D82A}">
-                    <a16:rowId xmlns:a16="http://schemas.microsoft.com/office/drawing/2014/main" xmlns="" val="10000"/>
+                    <a16:rowId xmlns="" xmlns:a16="http://schemas.microsoft.com/office/drawing/2014/main" val="10000"/>
                   </a:ext>
                 </a:extLst>
               </a:tr>
@@ -4462,7 +4462,7 @@
                 </a:tc>
                 <a:extLst>
                   <a:ext uri="{0D108BD9-81ED-4DB2-BD59-A6C34878D82A}">
-                    <a16:rowId xmlns:a16="http://schemas.microsoft.com/office/drawing/2014/main" xmlns="" val="10001"/>
+                    <a16:rowId xmlns="" xmlns:a16="http://schemas.microsoft.com/office/drawing/2014/main" val="10001"/>
                   </a:ext>
                 </a:extLst>
               </a:tr>
@@ -4694,14 +4694,14 @@
                 <a:gridCol w="3365629">
                   <a:extLst>
                     <a:ext uri="{9D8B030D-6E8A-4147-A177-3AD203B41FA5}">
-                      <a16:colId xmlns:a16="http://schemas.microsoft.com/office/drawing/2014/main" xmlns="" val="20000"/>
+                      <a16:colId xmlns="" xmlns:a16="http://schemas.microsoft.com/office/drawing/2014/main" val="20000"/>
                     </a:ext>
                   </a:extLst>
                 </a:gridCol>
                 <a:gridCol w="7258478">
                   <a:extLst>
                     <a:ext uri="{9D8B030D-6E8A-4147-A177-3AD203B41FA5}">
-                      <a16:colId xmlns:a16="http://schemas.microsoft.com/office/drawing/2014/main" xmlns="" val="20001"/>
+                      <a16:colId xmlns="" xmlns:a16="http://schemas.microsoft.com/office/drawing/2014/main" val="20001"/>
                     </a:ext>
                   </a:extLst>
                 </a:gridCol>
@@ -4779,7 +4779,7 @@
                 </a:tc>
                 <a:extLst>
                   <a:ext uri="{0D108BD9-81ED-4DB2-BD59-A6C34878D82A}">
-                    <a16:rowId xmlns:a16="http://schemas.microsoft.com/office/drawing/2014/main" xmlns="" val="10000"/>
+                    <a16:rowId xmlns="" xmlns:a16="http://schemas.microsoft.com/office/drawing/2014/main" val="10000"/>
                   </a:ext>
                 </a:extLst>
               </a:tr>
@@ -4930,7 +4930,7 @@
                 </a:tc>
                 <a:extLst>
                   <a:ext uri="{0D108BD9-81ED-4DB2-BD59-A6C34878D82A}">
-                    <a16:rowId xmlns:a16="http://schemas.microsoft.com/office/drawing/2014/main" xmlns="" val="10001"/>
+                    <a16:rowId xmlns="" xmlns:a16="http://schemas.microsoft.com/office/drawing/2014/main" val="10001"/>
                   </a:ext>
                 </a:extLst>
               </a:tr>
@@ -5111,7 +5111,7 @@
                 </a:tc>
                 <a:extLst>
                   <a:ext uri="{0D108BD9-81ED-4DB2-BD59-A6C34878D82A}">
-                    <a16:rowId xmlns:a16="http://schemas.microsoft.com/office/drawing/2014/main" xmlns="" val="10002"/>
+                    <a16:rowId xmlns="" xmlns:a16="http://schemas.microsoft.com/office/drawing/2014/main" val="10002"/>
                   </a:ext>
                 </a:extLst>
               </a:tr>
@@ -5296,14 +5296,14 @@
                 <a:gridCol w="3450929">
                   <a:extLst>
                     <a:ext uri="{9D8B030D-6E8A-4147-A177-3AD203B41FA5}">
-                      <a16:colId xmlns:a16="http://schemas.microsoft.com/office/drawing/2014/main" xmlns="" val="20000"/>
+                      <a16:colId xmlns="" xmlns:a16="http://schemas.microsoft.com/office/drawing/2014/main" val="20000"/>
                     </a:ext>
                   </a:extLst>
                 </a:gridCol>
                 <a:gridCol w="6983007">
                   <a:extLst>
                     <a:ext uri="{9D8B030D-6E8A-4147-A177-3AD203B41FA5}">
-                      <a16:colId xmlns:a16="http://schemas.microsoft.com/office/drawing/2014/main" xmlns="" val="20001"/>
+                      <a16:colId xmlns="" xmlns:a16="http://schemas.microsoft.com/office/drawing/2014/main" val="20001"/>
                     </a:ext>
                   </a:extLst>
                 </a:gridCol>
@@ -5383,7 +5383,7 @@
                 </a:tc>
                 <a:extLst>
                   <a:ext uri="{0D108BD9-81ED-4DB2-BD59-A6C34878D82A}">
-                    <a16:rowId xmlns:a16="http://schemas.microsoft.com/office/drawing/2014/main" xmlns="" val="10000"/>
+                    <a16:rowId xmlns="" xmlns:a16="http://schemas.microsoft.com/office/drawing/2014/main" val="10000"/>
                   </a:ext>
                 </a:extLst>
               </a:tr>
@@ -5576,7 +5576,7 @@
                 </a:tc>
                 <a:extLst>
                   <a:ext uri="{0D108BD9-81ED-4DB2-BD59-A6C34878D82A}">
-                    <a16:rowId xmlns:a16="http://schemas.microsoft.com/office/drawing/2014/main" xmlns="" val="10001"/>
+                    <a16:rowId xmlns="" xmlns:a16="http://schemas.microsoft.com/office/drawing/2014/main" val="10001"/>
                   </a:ext>
                 </a:extLst>
               </a:tr>
@@ -5757,7 +5757,7 @@
                 </a:tc>
                 <a:extLst>
                   <a:ext uri="{0D108BD9-81ED-4DB2-BD59-A6C34878D82A}">
-                    <a16:rowId xmlns:a16="http://schemas.microsoft.com/office/drawing/2014/main" xmlns="" val="10002"/>
+                    <a16:rowId xmlns="" xmlns:a16="http://schemas.microsoft.com/office/drawing/2014/main" val="10002"/>
                   </a:ext>
                 </a:extLst>
               </a:tr>
@@ -5913,7 +5913,7 @@
           <p:cNvPr id="2" name="Title 1">
             <a:extLst>
               <a:ext uri="{FF2B5EF4-FFF2-40B4-BE49-F238E27FC236}">
-                <a16:creationId xmlns:a16="http://schemas.microsoft.com/office/drawing/2014/main" xmlns="" id="{4EEC2E0C-F73F-4C5B-83E3-0A2A48AF01ED}"/>
+                <a16:creationId xmlns="" xmlns:a16="http://schemas.microsoft.com/office/drawing/2014/main" id="{4EEC2E0C-F73F-4C5B-83E3-0A2A48AF01ED}"/>
               </a:ext>
             </a:extLst>
           </p:cNvPr>
@@ -5948,7 +5948,7 @@
           <p:cNvPr id="5" name="Content Placeholder 4" descr="A close up of a map&#10;&#10;Description automatically generated">
             <a:extLst>
               <a:ext uri="{FF2B5EF4-FFF2-40B4-BE49-F238E27FC236}">
-                <a16:creationId xmlns:a16="http://schemas.microsoft.com/office/drawing/2014/main" xmlns="" id="{6CA20D7A-971B-4706-975C-390C752AF709}"/>
+                <a16:creationId xmlns="" xmlns:a16="http://schemas.microsoft.com/office/drawing/2014/main" id="{6CA20D7A-971B-4706-975C-390C752AF709}"/>
               </a:ext>
             </a:extLst>
           </p:cNvPr>
@@ -6007,7 +6007,7 @@
           <p:cNvPr id="2" name="Title 1">
             <a:extLst>
               <a:ext uri="{FF2B5EF4-FFF2-40B4-BE49-F238E27FC236}">
-                <a16:creationId xmlns:a16="http://schemas.microsoft.com/office/drawing/2014/main" xmlns="" id="{D01D6F5C-1424-4873-A38F-4620227219EE}"/>
+                <a16:creationId xmlns="" xmlns:a16="http://schemas.microsoft.com/office/drawing/2014/main" id="{D01D6F5C-1424-4873-A38F-4620227219EE}"/>
               </a:ext>
             </a:extLst>
           </p:cNvPr>
@@ -6058,7 +6058,7 @@
           <p:cNvPr id="5" name="Content Placeholder 4" descr="A close up of a map&#10;&#10;Description automatically generated">
             <a:extLst>
               <a:ext uri="{FF2B5EF4-FFF2-40B4-BE49-F238E27FC236}">
-                <a16:creationId xmlns:a16="http://schemas.microsoft.com/office/drawing/2014/main" xmlns="" id="{C98D7A44-4395-4509-B3BB-709EAE79D391}"/>
+                <a16:creationId xmlns="" xmlns:a16="http://schemas.microsoft.com/office/drawing/2014/main" id="{C98D7A44-4395-4509-B3BB-709EAE79D391}"/>
               </a:ext>
             </a:extLst>
           </p:cNvPr>
@@ -6117,7 +6117,7 @@
           <p:cNvPr id="2" name="Title 1">
             <a:extLst>
               <a:ext uri="{FF2B5EF4-FFF2-40B4-BE49-F238E27FC236}">
-                <a16:creationId xmlns:a16="http://schemas.microsoft.com/office/drawing/2014/main" xmlns="" id="{EE6EC4DB-CC0B-4B98-97AB-786A01B52965}"/>
+                <a16:creationId xmlns="" xmlns:a16="http://schemas.microsoft.com/office/drawing/2014/main" id="{EE6EC4DB-CC0B-4B98-97AB-786A01B52965}"/>
               </a:ext>
             </a:extLst>
           </p:cNvPr>
@@ -6160,7 +6160,7 @@
           <p:cNvPr id="5" name="Content Placeholder 4" descr="A close up of a map&#10;&#10;Description automatically generated">
             <a:extLst>
               <a:ext uri="{FF2B5EF4-FFF2-40B4-BE49-F238E27FC236}">
-                <a16:creationId xmlns:a16="http://schemas.microsoft.com/office/drawing/2014/main" xmlns="" id="{9BE09307-68BB-40A1-B103-E3789CF52762}"/>
+                <a16:creationId xmlns="" xmlns:a16="http://schemas.microsoft.com/office/drawing/2014/main" id="{9BE09307-68BB-40A1-B103-E3789CF52762}"/>
               </a:ext>
             </a:extLst>
           </p:cNvPr>
@@ -6219,7 +6219,7 @@
           <p:cNvPr id="2" name="Title 1">
             <a:extLst>
               <a:ext uri="{FF2B5EF4-FFF2-40B4-BE49-F238E27FC236}">
-                <a16:creationId xmlns:a16="http://schemas.microsoft.com/office/drawing/2014/main" xmlns="" id="{14A0F59C-87AE-479C-ACF9-6205AA56A33D}"/>
+                <a16:creationId xmlns="" xmlns:a16="http://schemas.microsoft.com/office/drawing/2014/main" id="{14A0F59C-87AE-479C-ACF9-6205AA56A33D}"/>
               </a:ext>
             </a:extLst>
           </p:cNvPr>
@@ -6262,7 +6262,7 @@
           <p:cNvPr id="5" name="Content Placeholder 4" descr="A close up of a map&#10;&#10;Description automatically generated">
             <a:extLst>
               <a:ext uri="{FF2B5EF4-FFF2-40B4-BE49-F238E27FC236}">
-                <a16:creationId xmlns:a16="http://schemas.microsoft.com/office/drawing/2014/main" xmlns="" id="{E024F4B3-469D-4917-9F60-A00C69A4F24D}"/>
+                <a16:creationId xmlns="" xmlns:a16="http://schemas.microsoft.com/office/drawing/2014/main" id="{E024F4B3-469D-4917-9F60-A00C69A4F24D}"/>
               </a:ext>
             </a:extLst>
           </p:cNvPr>
@@ -6321,7 +6321,7 @@
           <p:cNvPr id="2" name="Title 1">
             <a:extLst>
               <a:ext uri="{FF2B5EF4-FFF2-40B4-BE49-F238E27FC236}">
-                <a16:creationId xmlns:a16="http://schemas.microsoft.com/office/drawing/2014/main" xmlns="" id="{4BDEF6FA-4770-4FC6-A635-06878EB741C1}"/>
+                <a16:creationId xmlns="" xmlns:a16="http://schemas.microsoft.com/office/drawing/2014/main" id="{4BDEF6FA-4770-4FC6-A635-06878EB741C1}"/>
               </a:ext>
             </a:extLst>
           </p:cNvPr>
@@ -6364,7 +6364,7 @@
           <p:cNvPr id="5" name="Content Placeholder 4" descr="A close up of a map&#10;&#10;Description automatically generated">
             <a:extLst>
               <a:ext uri="{FF2B5EF4-FFF2-40B4-BE49-F238E27FC236}">
-                <a16:creationId xmlns:a16="http://schemas.microsoft.com/office/drawing/2014/main" xmlns="" id="{E4639449-7866-466E-B5DA-CA19656C4D7A}"/>
+                <a16:creationId xmlns="" xmlns:a16="http://schemas.microsoft.com/office/drawing/2014/main" id="{E4639449-7866-466E-B5DA-CA19656C4D7A}"/>
               </a:ext>
             </a:extLst>
           </p:cNvPr>
@@ -6977,14 +6977,14 @@
                 <a:gridCol w="2724972">
                   <a:extLst>
                     <a:ext uri="{9D8B030D-6E8A-4147-A177-3AD203B41FA5}">
-                      <a16:colId xmlns:a16="http://schemas.microsoft.com/office/drawing/2014/main" xmlns="" val="20000"/>
+                      <a16:colId xmlns="" xmlns:a16="http://schemas.microsoft.com/office/drawing/2014/main" val="20000"/>
                     </a:ext>
                   </a:extLst>
                 </a:gridCol>
                 <a:gridCol w="7055636">
                   <a:extLst>
                     <a:ext uri="{9D8B030D-6E8A-4147-A177-3AD203B41FA5}">
-                      <a16:colId xmlns:a16="http://schemas.microsoft.com/office/drawing/2014/main" xmlns="" val="20001"/>
+                      <a16:colId xmlns="" xmlns:a16="http://schemas.microsoft.com/office/drawing/2014/main" val="20001"/>
                     </a:ext>
                   </a:extLst>
                 </a:gridCol>
@@ -7056,7 +7056,7 @@
                 </a:tc>
                 <a:extLst>
                   <a:ext uri="{0D108BD9-81ED-4DB2-BD59-A6C34878D82A}">
-                    <a16:rowId xmlns:a16="http://schemas.microsoft.com/office/drawing/2014/main" xmlns="" val="10000"/>
+                    <a16:rowId xmlns="" xmlns:a16="http://schemas.microsoft.com/office/drawing/2014/main" val="10000"/>
                   </a:ext>
                 </a:extLst>
               </a:tr>
@@ -7127,7 +7127,7 @@
                 </a:tc>
                 <a:extLst>
                   <a:ext uri="{0D108BD9-81ED-4DB2-BD59-A6C34878D82A}">
-                    <a16:rowId xmlns:a16="http://schemas.microsoft.com/office/drawing/2014/main" xmlns="" val="10001"/>
+                    <a16:rowId xmlns="" xmlns:a16="http://schemas.microsoft.com/office/drawing/2014/main" val="10001"/>
                   </a:ext>
                 </a:extLst>
               </a:tr>
@@ -7198,7 +7198,7 @@
                 </a:tc>
                 <a:extLst>
                   <a:ext uri="{0D108BD9-81ED-4DB2-BD59-A6C34878D82A}">
-                    <a16:rowId xmlns:a16="http://schemas.microsoft.com/office/drawing/2014/main" xmlns="" val="10002"/>
+                    <a16:rowId xmlns="" xmlns:a16="http://schemas.microsoft.com/office/drawing/2014/main" val="10002"/>
                   </a:ext>
                 </a:extLst>
               </a:tr>
@@ -7291,7 +7291,7 @@
                 </a:tc>
                 <a:extLst>
                   <a:ext uri="{0D108BD9-81ED-4DB2-BD59-A6C34878D82A}">
-                    <a16:rowId xmlns:a16="http://schemas.microsoft.com/office/drawing/2014/main" xmlns="" val="10003"/>
+                    <a16:rowId xmlns="" xmlns:a16="http://schemas.microsoft.com/office/drawing/2014/main" val="10003"/>
                   </a:ext>
                 </a:extLst>
               </a:tr>
@@ -7387,14 +7387,14 @@
                 <a:gridCol w="2627565">
                   <a:extLst>
                     <a:ext uri="{9D8B030D-6E8A-4147-A177-3AD203B41FA5}">
-                      <a16:colId xmlns:a16="http://schemas.microsoft.com/office/drawing/2014/main" xmlns="" val="20000"/>
+                      <a16:colId xmlns="" xmlns:a16="http://schemas.microsoft.com/office/drawing/2014/main" val="20000"/>
                     </a:ext>
                   </a:extLst>
                 </a:gridCol>
                 <a:gridCol w="7900420">
                   <a:extLst>
                     <a:ext uri="{9D8B030D-6E8A-4147-A177-3AD203B41FA5}">
-                      <a16:colId xmlns:a16="http://schemas.microsoft.com/office/drawing/2014/main" xmlns="" val="20001"/>
+                      <a16:colId xmlns="" xmlns:a16="http://schemas.microsoft.com/office/drawing/2014/main" val="20001"/>
                     </a:ext>
                   </a:extLst>
                 </a:gridCol>
@@ -7466,7 +7466,7 @@
                 </a:tc>
                 <a:extLst>
                   <a:ext uri="{0D108BD9-81ED-4DB2-BD59-A6C34878D82A}">
-                    <a16:rowId xmlns:a16="http://schemas.microsoft.com/office/drawing/2014/main" xmlns="" val="10000"/>
+                    <a16:rowId xmlns="" xmlns:a16="http://schemas.microsoft.com/office/drawing/2014/main" val="10000"/>
                   </a:ext>
                 </a:extLst>
               </a:tr>
@@ -7537,7 +7537,7 @@
                 </a:tc>
                 <a:extLst>
                   <a:ext uri="{0D108BD9-81ED-4DB2-BD59-A6C34878D82A}">
-                    <a16:rowId xmlns:a16="http://schemas.microsoft.com/office/drawing/2014/main" xmlns="" val="10001"/>
+                    <a16:rowId xmlns="" xmlns:a16="http://schemas.microsoft.com/office/drawing/2014/main" val="10001"/>
                   </a:ext>
                 </a:extLst>
               </a:tr>
@@ -7608,7 +7608,7 @@
                 </a:tc>
                 <a:extLst>
                   <a:ext uri="{0D108BD9-81ED-4DB2-BD59-A6C34878D82A}">
-                    <a16:rowId xmlns:a16="http://schemas.microsoft.com/office/drawing/2014/main" xmlns="" val="10002"/>
+                    <a16:rowId xmlns="" xmlns:a16="http://schemas.microsoft.com/office/drawing/2014/main" val="10002"/>
                   </a:ext>
                 </a:extLst>
               </a:tr>
@@ -7679,7 +7679,7 @@
                 </a:tc>
                 <a:extLst>
                   <a:ext uri="{0D108BD9-81ED-4DB2-BD59-A6C34878D82A}">
-                    <a16:rowId xmlns:a16="http://schemas.microsoft.com/office/drawing/2014/main" xmlns="" val="10003"/>
+                    <a16:rowId xmlns="" xmlns:a16="http://schemas.microsoft.com/office/drawing/2014/main" val="10003"/>
                   </a:ext>
                 </a:extLst>
               </a:tr>
@@ -7750,7 +7750,7 @@
                 </a:tc>
                 <a:extLst>
                   <a:ext uri="{0D108BD9-81ED-4DB2-BD59-A6C34878D82A}">
-                    <a16:rowId xmlns:a16="http://schemas.microsoft.com/office/drawing/2014/main" xmlns="" val="10004"/>
+                    <a16:rowId xmlns="" xmlns:a16="http://schemas.microsoft.com/office/drawing/2014/main" val="10004"/>
                   </a:ext>
                 </a:extLst>
               </a:tr>
@@ -7821,7 +7821,7 @@
                 </a:tc>
                 <a:extLst>
                   <a:ext uri="{0D108BD9-81ED-4DB2-BD59-A6C34878D82A}">
-                    <a16:rowId xmlns:a16="http://schemas.microsoft.com/office/drawing/2014/main" xmlns="" val="10005"/>
+                    <a16:rowId xmlns="" xmlns:a16="http://schemas.microsoft.com/office/drawing/2014/main" val="10005"/>
                   </a:ext>
                 </a:extLst>
               </a:tr>
@@ -7857,21 +7857,21 @@
                 <a:gridCol w="1159088">
                   <a:extLst>
                     <a:ext uri="{9D8B030D-6E8A-4147-A177-3AD203B41FA5}">
-                      <a16:colId xmlns:a16="http://schemas.microsoft.com/office/drawing/2014/main" xmlns="" val="20000"/>
+                      <a16:colId xmlns="" xmlns:a16="http://schemas.microsoft.com/office/drawing/2014/main" val="20000"/>
                     </a:ext>
                   </a:extLst>
                 </a:gridCol>
                 <a:gridCol w="3510886">
                   <a:extLst>
                     <a:ext uri="{9D8B030D-6E8A-4147-A177-3AD203B41FA5}">
-                      <a16:colId xmlns:a16="http://schemas.microsoft.com/office/drawing/2014/main" xmlns="" val="20001"/>
+                      <a16:colId xmlns="" xmlns:a16="http://schemas.microsoft.com/office/drawing/2014/main" val="20001"/>
                     </a:ext>
                   </a:extLst>
                 </a:gridCol>
                 <a:gridCol w="5818308">
                   <a:extLst>
                     <a:ext uri="{9D8B030D-6E8A-4147-A177-3AD203B41FA5}">
-                      <a16:colId xmlns:a16="http://schemas.microsoft.com/office/drawing/2014/main" xmlns="" val="20002"/>
+                      <a16:colId xmlns="" xmlns:a16="http://schemas.microsoft.com/office/drawing/2014/main" val="20002"/>
                     </a:ext>
                   </a:extLst>
                 </a:gridCol>
@@ -7975,7 +7975,7 @@
                 </a:tc>
                 <a:extLst>
                   <a:ext uri="{0D108BD9-81ED-4DB2-BD59-A6C34878D82A}">
-                    <a16:rowId xmlns:a16="http://schemas.microsoft.com/office/drawing/2014/main" xmlns="" val="10000"/>
+                    <a16:rowId xmlns="" xmlns:a16="http://schemas.microsoft.com/office/drawing/2014/main" val="10000"/>
                   </a:ext>
                 </a:extLst>
               </a:tr>
@@ -8078,7 +8078,7 @@
                 </a:tc>
                 <a:extLst>
                   <a:ext uri="{0D108BD9-81ED-4DB2-BD59-A6C34878D82A}">
-                    <a16:rowId xmlns:a16="http://schemas.microsoft.com/office/drawing/2014/main" xmlns="" val="10001"/>
+                    <a16:rowId xmlns="" xmlns:a16="http://schemas.microsoft.com/office/drawing/2014/main" val="10001"/>
                   </a:ext>
                 </a:extLst>
               </a:tr>
@@ -8181,7 +8181,7 @@
                 </a:tc>
                 <a:extLst>
                   <a:ext uri="{0D108BD9-81ED-4DB2-BD59-A6C34878D82A}">
-                    <a16:rowId xmlns:a16="http://schemas.microsoft.com/office/drawing/2014/main" xmlns="" val="10002"/>
+                    <a16:rowId xmlns="" xmlns:a16="http://schemas.microsoft.com/office/drawing/2014/main" val="10002"/>
                   </a:ext>
                 </a:extLst>
               </a:tr>
@@ -8284,7 +8284,7 @@
                 </a:tc>
                 <a:extLst>
                   <a:ext uri="{0D108BD9-81ED-4DB2-BD59-A6C34878D82A}">
-                    <a16:rowId xmlns:a16="http://schemas.microsoft.com/office/drawing/2014/main" xmlns="" val="10003"/>
+                    <a16:rowId xmlns="" xmlns:a16="http://schemas.microsoft.com/office/drawing/2014/main" val="10003"/>
                   </a:ext>
                 </a:extLst>
               </a:tr>
@@ -8382,7 +8382,7 @@
           <p:cNvPr id="2" name="Title 1">
             <a:extLst>
               <a:ext uri="{FF2B5EF4-FFF2-40B4-BE49-F238E27FC236}">
-                <a16:creationId xmlns:a16="http://schemas.microsoft.com/office/drawing/2014/main" xmlns="" id="{C27109A9-8D84-486A-AD51-B63C3C6BDB5C}"/>
+                <a16:creationId xmlns="" xmlns:a16="http://schemas.microsoft.com/office/drawing/2014/main" id="{C27109A9-8D84-486A-AD51-B63C3C6BDB5C}"/>
               </a:ext>
             </a:extLst>
           </p:cNvPr>
@@ -8417,7 +8417,7 @@
           <p:cNvPr id="4" name="Content Placeholder 3">
             <a:extLst>
               <a:ext uri="{FF2B5EF4-FFF2-40B4-BE49-F238E27FC236}">
-                <a16:creationId xmlns:a16="http://schemas.microsoft.com/office/drawing/2014/main" xmlns="" id="{0111AAB1-A7D6-48C6-B93D-2BF15034E452}"/>
+                <a16:creationId xmlns="" xmlns:a16="http://schemas.microsoft.com/office/drawing/2014/main" id="{0111AAB1-A7D6-48C6-B93D-2BF15034E452}"/>
               </a:ext>
             </a:extLst>
           </p:cNvPr>
@@ -8442,56 +8442,56 @@
                 <a:gridCol w="369962">
                   <a:extLst>
                     <a:ext uri="{9D8B030D-6E8A-4147-A177-3AD203B41FA5}">
-                      <a16:colId xmlns:a16="http://schemas.microsoft.com/office/drawing/2014/main" xmlns="" val="3571866511"/>
+                      <a16:colId xmlns="" xmlns:a16="http://schemas.microsoft.com/office/drawing/2014/main" val="3571866511"/>
                     </a:ext>
                   </a:extLst>
                 </a:gridCol>
                 <a:gridCol w="2799501">
                   <a:extLst>
                     <a:ext uri="{9D8B030D-6E8A-4147-A177-3AD203B41FA5}">
-                      <a16:colId xmlns:a16="http://schemas.microsoft.com/office/drawing/2014/main" xmlns="" val="1421687479"/>
+                      <a16:colId xmlns="" xmlns:a16="http://schemas.microsoft.com/office/drawing/2014/main" val="1421687479"/>
                     </a:ext>
                   </a:extLst>
                 </a:gridCol>
                 <a:gridCol w="2564445">
                   <a:extLst>
                     <a:ext uri="{9D8B030D-6E8A-4147-A177-3AD203B41FA5}">
-                      <a16:colId xmlns:a16="http://schemas.microsoft.com/office/drawing/2014/main" xmlns="" val="3899242390"/>
+                      <a16:colId xmlns="" xmlns:a16="http://schemas.microsoft.com/office/drawing/2014/main" val="3899242390"/>
                     </a:ext>
                   </a:extLst>
                 </a:gridCol>
                 <a:gridCol w="185630">
                   <a:extLst>
                     <a:ext uri="{9D8B030D-6E8A-4147-A177-3AD203B41FA5}">
-                      <a16:colId xmlns:a16="http://schemas.microsoft.com/office/drawing/2014/main" xmlns="" val="2048303212"/>
+                      <a16:colId xmlns="" xmlns:a16="http://schemas.microsoft.com/office/drawing/2014/main" val="2048303212"/>
                     </a:ext>
                   </a:extLst>
                 </a:gridCol>
                 <a:gridCol w="295633">
                   <a:extLst>
                     <a:ext uri="{9D8B030D-6E8A-4147-A177-3AD203B41FA5}">
-                      <a16:colId xmlns:a16="http://schemas.microsoft.com/office/drawing/2014/main" xmlns="" val="746535854"/>
+                      <a16:colId xmlns="" xmlns:a16="http://schemas.microsoft.com/office/drawing/2014/main" val="746535854"/>
                     </a:ext>
                   </a:extLst>
                 </a:gridCol>
                 <a:gridCol w="93980">
                   <a:extLst>
                     <a:ext uri="{9D8B030D-6E8A-4147-A177-3AD203B41FA5}">
-                      <a16:colId xmlns:a16="http://schemas.microsoft.com/office/drawing/2014/main" xmlns="" val="1517551828"/>
+                      <a16:colId xmlns="" xmlns:a16="http://schemas.microsoft.com/office/drawing/2014/main" val="1517551828"/>
                     </a:ext>
                   </a:extLst>
                 </a:gridCol>
                 <a:gridCol w="284155">
                   <a:extLst>
                     <a:ext uri="{9D8B030D-6E8A-4147-A177-3AD203B41FA5}">
-                      <a16:colId xmlns:a16="http://schemas.microsoft.com/office/drawing/2014/main" xmlns="" val="1975296765"/>
+                      <a16:colId xmlns="" xmlns:a16="http://schemas.microsoft.com/office/drawing/2014/main" val="1975296765"/>
                     </a:ext>
                   </a:extLst>
                 </a:gridCol>
                 <a:gridCol w="3730954">
                   <a:extLst>
                     <a:ext uri="{9D8B030D-6E8A-4147-A177-3AD203B41FA5}">
-                      <a16:colId xmlns:a16="http://schemas.microsoft.com/office/drawing/2014/main" xmlns="" val="1563690532"/>
+                      <a16:colId xmlns="" xmlns:a16="http://schemas.microsoft.com/office/drawing/2014/main" val="1563690532"/>
                     </a:ext>
                   </a:extLst>
                 </a:gridCol>
@@ -8761,7 +8761,7 @@
                 </a:tc>
                 <a:extLst>
                   <a:ext uri="{0D108BD9-81ED-4DB2-BD59-A6C34878D82A}">
-                    <a16:rowId xmlns:a16="http://schemas.microsoft.com/office/drawing/2014/main" xmlns="" val="2790610759"/>
+                    <a16:rowId xmlns="" xmlns:a16="http://schemas.microsoft.com/office/drawing/2014/main" val="2790610759"/>
                   </a:ext>
                 </a:extLst>
               </a:tr>
@@ -8854,7 +8854,7 @@
                 </a:tc>
                 <a:extLst>
                   <a:ext uri="{0D108BD9-81ED-4DB2-BD59-A6C34878D82A}">
-                    <a16:rowId xmlns:a16="http://schemas.microsoft.com/office/drawing/2014/main" xmlns="" val="2643930646"/>
+                    <a16:rowId xmlns="" xmlns:a16="http://schemas.microsoft.com/office/drawing/2014/main" val="2643930646"/>
                   </a:ext>
                 </a:extLst>
               </a:tr>
@@ -9068,7 +9068,7 @@
                 </a:tc>
                 <a:extLst>
                   <a:ext uri="{0D108BD9-81ED-4DB2-BD59-A6C34878D82A}">
-                    <a16:rowId xmlns:a16="http://schemas.microsoft.com/office/drawing/2014/main" xmlns="" val="3304438575"/>
+                    <a16:rowId xmlns="" xmlns:a16="http://schemas.microsoft.com/office/drawing/2014/main" val="3304438575"/>
                   </a:ext>
                 </a:extLst>
               </a:tr>
@@ -9294,7 +9294,7 @@
                 </a:tc>
                 <a:extLst>
                   <a:ext uri="{0D108BD9-81ED-4DB2-BD59-A6C34878D82A}">
-                    <a16:rowId xmlns:a16="http://schemas.microsoft.com/office/drawing/2014/main" xmlns="" val="1091830123"/>
+                    <a16:rowId xmlns="" xmlns:a16="http://schemas.microsoft.com/office/drawing/2014/main" val="1091830123"/>
                   </a:ext>
                 </a:extLst>
               </a:tr>
@@ -9508,7 +9508,7 @@
                 </a:tc>
                 <a:extLst>
                   <a:ext uri="{0D108BD9-81ED-4DB2-BD59-A6C34878D82A}">
-                    <a16:rowId xmlns:a16="http://schemas.microsoft.com/office/drawing/2014/main" xmlns="" val="195937988"/>
+                    <a16:rowId xmlns="" xmlns:a16="http://schemas.microsoft.com/office/drawing/2014/main" val="195937988"/>
                   </a:ext>
                 </a:extLst>
               </a:tr>
@@ -9601,7 +9601,7 @@
                 </a:tc>
                 <a:extLst>
                   <a:ext uri="{0D108BD9-81ED-4DB2-BD59-A6C34878D82A}">
-                    <a16:rowId xmlns:a16="http://schemas.microsoft.com/office/drawing/2014/main" xmlns="" val="4166280157"/>
+                    <a16:rowId xmlns="" xmlns:a16="http://schemas.microsoft.com/office/drawing/2014/main" val="4166280157"/>
                   </a:ext>
                 </a:extLst>
               </a:tr>
@@ -9840,7 +9840,7 @@
                 </a:tc>
                 <a:extLst>
                   <a:ext uri="{0D108BD9-81ED-4DB2-BD59-A6C34878D82A}">
-                    <a16:rowId xmlns:a16="http://schemas.microsoft.com/office/drawing/2014/main" xmlns="" val="1405325198"/>
+                    <a16:rowId xmlns="" xmlns:a16="http://schemas.microsoft.com/office/drawing/2014/main" val="1405325198"/>
                   </a:ext>
                 </a:extLst>
               </a:tr>
@@ -10079,7 +10079,7 @@
                 </a:tc>
                 <a:extLst>
                   <a:ext uri="{0D108BD9-81ED-4DB2-BD59-A6C34878D82A}">
-                    <a16:rowId xmlns:a16="http://schemas.microsoft.com/office/drawing/2014/main" xmlns="" val="2816664006"/>
+                    <a16:rowId xmlns="" xmlns:a16="http://schemas.microsoft.com/office/drawing/2014/main" val="2816664006"/>
                   </a:ext>
                 </a:extLst>
               </a:tr>
@@ -10172,7 +10172,7 @@
                 </a:tc>
                 <a:extLst>
                   <a:ext uri="{0D108BD9-81ED-4DB2-BD59-A6C34878D82A}">
-                    <a16:rowId xmlns:a16="http://schemas.microsoft.com/office/drawing/2014/main" xmlns="" val="3466216339"/>
+                    <a16:rowId xmlns="" xmlns:a16="http://schemas.microsoft.com/office/drawing/2014/main" val="3466216339"/>
                   </a:ext>
                 </a:extLst>
               </a:tr>
@@ -10411,7 +10411,7 @@
                 </a:tc>
                 <a:extLst>
                   <a:ext uri="{0D108BD9-81ED-4DB2-BD59-A6C34878D82A}">
-                    <a16:rowId xmlns:a16="http://schemas.microsoft.com/office/drawing/2014/main" xmlns="" val="3192613793"/>
+                    <a16:rowId xmlns="" xmlns:a16="http://schemas.microsoft.com/office/drawing/2014/main" val="3192613793"/>
                   </a:ext>
                 </a:extLst>
               </a:tr>
@@ -10650,7 +10650,7 @@
                 </a:tc>
                 <a:extLst>
                   <a:ext uri="{0D108BD9-81ED-4DB2-BD59-A6C34878D82A}">
-                    <a16:rowId xmlns:a16="http://schemas.microsoft.com/office/drawing/2014/main" xmlns="" val="1937383606"/>
+                    <a16:rowId xmlns="" xmlns:a16="http://schemas.microsoft.com/office/drawing/2014/main" val="1937383606"/>
                   </a:ext>
                 </a:extLst>
               </a:tr>
@@ -10889,7 +10889,7 @@
                 </a:tc>
                 <a:extLst>
                   <a:ext uri="{0D108BD9-81ED-4DB2-BD59-A6C34878D82A}">
-                    <a16:rowId xmlns:a16="http://schemas.microsoft.com/office/drawing/2014/main" xmlns="" val="3994458559"/>
+                    <a16:rowId xmlns="" xmlns:a16="http://schemas.microsoft.com/office/drawing/2014/main" val="3994458559"/>
                   </a:ext>
                 </a:extLst>
               </a:tr>
@@ -10962,7 +10962,7 @@
           <p:cNvPr id="5" name="Content Placeholder 4">
             <a:extLst>
               <a:ext uri="{FF2B5EF4-FFF2-40B4-BE49-F238E27FC236}">
-                <a16:creationId xmlns:a16="http://schemas.microsoft.com/office/drawing/2014/main" xmlns="" id="{6BEF5C33-2C1C-4462-BF56-BF3F99F3356F}"/>
+                <a16:creationId xmlns="" xmlns:a16="http://schemas.microsoft.com/office/drawing/2014/main" id="{6BEF5C33-2C1C-4462-BF56-BF3F99F3356F}"/>
               </a:ext>
             </a:extLst>
           </p:cNvPr>
@@ -11217,14 +11217,14 @@
                 <a:gridCol w="5216968">
                   <a:extLst>
                     <a:ext uri="{9D8B030D-6E8A-4147-A177-3AD203B41FA5}">
-                      <a16:colId xmlns:a16="http://schemas.microsoft.com/office/drawing/2014/main" xmlns="" val="20000"/>
+                      <a16:colId xmlns="" xmlns:a16="http://schemas.microsoft.com/office/drawing/2014/main" val="20000"/>
                     </a:ext>
                   </a:extLst>
                 </a:gridCol>
                 <a:gridCol w="5216968">
                   <a:extLst>
                     <a:ext uri="{9D8B030D-6E8A-4147-A177-3AD203B41FA5}">
-                      <a16:colId xmlns:a16="http://schemas.microsoft.com/office/drawing/2014/main" xmlns="" val="20001"/>
+                      <a16:colId xmlns="" xmlns:a16="http://schemas.microsoft.com/office/drawing/2014/main" val="20001"/>
                     </a:ext>
                   </a:extLst>
                 </a:gridCol>
@@ -11302,7 +11302,7 @@
                 </a:tc>
                 <a:extLst>
                   <a:ext uri="{0D108BD9-81ED-4DB2-BD59-A6C34878D82A}">
-                    <a16:rowId xmlns:a16="http://schemas.microsoft.com/office/drawing/2014/main" xmlns="" val="10000"/>
+                    <a16:rowId xmlns="" xmlns:a16="http://schemas.microsoft.com/office/drawing/2014/main" val="10000"/>
                   </a:ext>
                 </a:extLst>
               </a:tr>
@@ -11422,7 +11422,7 @@
                 </a:tc>
                 <a:extLst>
                   <a:ext uri="{0D108BD9-81ED-4DB2-BD59-A6C34878D82A}">
-                    <a16:rowId xmlns:a16="http://schemas.microsoft.com/office/drawing/2014/main" xmlns="" val="10001"/>
+                    <a16:rowId xmlns="" xmlns:a16="http://schemas.microsoft.com/office/drawing/2014/main" val="10001"/>
                   </a:ext>
                 </a:extLst>
               </a:tr>
@@ -11632,14 +11632,14 @@
                 <a:gridCol w="3316957">
                   <a:extLst>
                     <a:ext uri="{9D8B030D-6E8A-4147-A177-3AD203B41FA5}">
-                      <a16:colId xmlns:a16="http://schemas.microsoft.com/office/drawing/2014/main" xmlns="" val="20000"/>
+                      <a16:colId xmlns="" xmlns:a16="http://schemas.microsoft.com/office/drawing/2014/main" val="20000"/>
                     </a:ext>
                   </a:extLst>
                 </a:gridCol>
                 <a:gridCol w="7116979">
                   <a:extLst>
                     <a:ext uri="{9D8B030D-6E8A-4147-A177-3AD203B41FA5}">
-                      <a16:colId xmlns:a16="http://schemas.microsoft.com/office/drawing/2014/main" xmlns="" val="20001"/>
+                      <a16:colId xmlns="" xmlns:a16="http://schemas.microsoft.com/office/drawing/2014/main" val="20001"/>
                     </a:ext>
                   </a:extLst>
                 </a:gridCol>
@@ -11717,7 +11717,7 @@
                 </a:tc>
                 <a:extLst>
                   <a:ext uri="{0D108BD9-81ED-4DB2-BD59-A6C34878D82A}">
-                    <a16:rowId xmlns:a16="http://schemas.microsoft.com/office/drawing/2014/main" xmlns="" val="10000"/>
+                    <a16:rowId xmlns="" xmlns:a16="http://schemas.microsoft.com/office/drawing/2014/main" val="10000"/>
                   </a:ext>
                 </a:extLst>
               </a:tr>
@@ -11830,7 +11830,7 @@
                 </a:tc>
                 <a:extLst>
                   <a:ext uri="{0D108BD9-81ED-4DB2-BD59-A6C34878D82A}">
-                    <a16:rowId xmlns:a16="http://schemas.microsoft.com/office/drawing/2014/main" xmlns="" val="10001"/>
+                    <a16:rowId xmlns="" xmlns:a16="http://schemas.microsoft.com/office/drawing/2014/main" val="10001"/>
                   </a:ext>
                 </a:extLst>
               </a:tr>

</xml_diff>